<commit_message>
Adding information in README file
</commit_message>
<xml_diff>
--- a/HandsON-HCSR04.pptx
+++ b/HandsON-HCSR04.pptx
@@ -3130,8 +3130,8 @@
               <a:t>/</a:t>
             </a:r>
             <a:r>
-              <a:rPr lang="es-ES" dirty="0" err="1" smtClean="0"/>
-              <a:t>YcIKZS</a:t>
+              <a:rPr lang="es-ES" smtClean="0"/>
+              <a:t>DaUAor</a:t>
             </a:r>
             <a:endParaRPr lang="es-ES" dirty="0"/>
           </a:p>
@@ -3207,6 +3207,13 @@
   <p:clrMapOvr>
     <a:masterClrMapping/>
   </p:clrMapOvr>
+  <p:timing>
+    <p:tnLst>
+      <p:par>
+        <p:cTn xmlns:p14="http://schemas.microsoft.com/office/powerpoint/2010/main" id="1" dur="indefinite" restart="never" nodeType="tmRoot"/>
+      </p:par>
+    </p:tnLst>
+  </p:timing>
 </p:sld>
 </file>
 
@@ -3314,6 +3321,13 @@
   <p:clrMapOvr>
     <a:masterClrMapping/>
   </p:clrMapOvr>
+  <p:timing>
+    <p:tnLst>
+      <p:par>
+        <p:cTn xmlns:p14="http://schemas.microsoft.com/office/powerpoint/2010/main" id="1" dur="indefinite" restart="never" nodeType="tmRoot"/>
+      </p:par>
+    </p:tnLst>
+  </p:timing>
 </p:sld>
 </file>
 

</xml_diff>